<commit_message>
presentation and concat fix
</commit_message>
<xml_diff>
--- a/Presentation/PureFun-Presentation.pptx
+++ b/Presentation/PureFun-Presentation.pptx
@@ -289,7 +289,7 @@
               <a:pPr>
                 <a:defRPr/>
               </a:pPr>
-              <a:t>27.06.2019</a:t>
+              <a:t>03.07.2019</a:t>
             </a:fld>
             <a:endParaRPr lang="de-DE" altLang="de-DE" dirty="0"/>
           </a:p>
@@ -494,7 +494,7 @@
               <a:pPr>
                 <a:defRPr/>
               </a:pPr>
-              <a:t>27.06.2019</a:t>
+              <a:t>03.07.2019</a:t>
             </a:fld>
             <a:endParaRPr lang="de-DE" altLang="de-DE" dirty="0"/>
           </a:p>
@@ -4370,7 +4370,7 @@
                   <a:schemeClr val="tx1"/>
                 </a:solidFill>
               </a:rPr>
-              <a:t>Adrian, Alexander, Pascal | </a:t>
+              <a:t>Adrian Schmitz, Alexander Gerstenberger, Pascal Siewert | </a:t>
             </a:r>
             <a:r>
               <a:rPr lang="de-DE" altLang="en-US" sz="900" dirty="0"/>
@@ -5935,7 +5935,7 @@
             </a:r>
             <a:r>
               <a:rPr lang="de-DE" dirty="0" err="1"/>
-              <a:t>Typechecking</a:t>
+              <a:t>typechecking</a:t>
             </a:r>
             <a:endParaRPr lang="de-DE" dirty="0"/>
           </a:p>
@@ -5959,7 +5959,15 @@
             </a:r>
             <a:r>
               <a:rPr lang="de-DE" dirty="0"/>
-              <a:t> Tupels </a:t>
+              <a:t> </a:t>
+            </a:r>
+            <a:r>
+              <a:rPr lang="de-DE" dirty="0" err="1"/>
+              <a:t>tupels</a:t>
+            </a:r>
+            <a:r>
+              <a:rPr lang="de-DE" dirty="0"/>
+              <a:t> </a:t>
             </a:r>
             <a:r>
               <a:rPr lang="de-DE" dirty="0" err="1"/>
@@ -5997,7 +6005,7 @@
           <a:p>
             <a:r>
               <a:rPr lang="en-GB" dirty="0"/>
-              <a:t>Code Inclusion</a:t>
+              <a:t>Code inclusion</a:t>
             </a:r>
           </a:p>
           <a:p>
@@ -6006,7 +6014,7 @@
           <a:p>
             <a:r>
               <a:rPr lang="en-GB" dirty="0"/>
-              <a:t>Well Structured Output</a:t>
+              <a:t>Well structured output</a:t>
             </a:r>
           </a:p>
           <a:p>
@@ -6031,21 +6039,21 @@
           <a:p>
             <a:r>
               <a:rPr lang="en-GB" dirty="0"/>
-              <a:t>More Parallel Execution</a:t>
+              <a:t>More parallel execution</a:t>
             </a:r>
           </a:p>
           <a:p>
             <a:pPr lvl="1"/>
             <a:r>
               <a:rPr lang="en-GB" dirty="0"/>
-              <a:t>Loop Parallelization</a:t>
+              <a:t>Loop parallelization</a:t>
             </a:r>
           </a:p>
           <a:p>
             <a:pPr lvl="1"/>
             <a:r>
               <a:rPr lang="en-GB" dirty="0"/>
-              <a:t>GPU Support</a:t>
+              <a:t>GPU support</a:t>
             </a:r>
           </a:p>
           <a:p>
@@ -6516,321 +6524,6 @@
           </p:txBody>
         </p:sp>
       </p:grpSp>
-      <p:sp>
-        <p:nvSpPr>
-          <p:cNvPr id="10" name="Inhaltsplatzhalter 1">
-            <a:extLst>
-              <a:ext uri="{FF2B5EF4-FFF2-40B4-BE49-F238E27FC236}">
-                <a16:creationId xmlns:a16="http://schemas.microsoft.com/office/drawing/2014/main" id="{0E8999A3-5EB4-4D2E-A2D3-4E7733F23E2E}"/>
-              </a:ext>
-            </a:extLst>
-          </p:cNvPr>
-          <p:cNvSpPr txBox="1">
-            <a:spLocks/>
-          </p:cNvSpPr>
-          <p:nvPr/>
-        </p:nvSpPr>
-        <p:spPr>
-          <a:xfrm>
-            <a:off x="384000" y="1236029"/>
-            <a:ext cx="5652000" cy="4385941"/>
-          </a:xfrm>
-          <a:prstGeom prst="rect">
-            <a:avLst/>
-          </a:prstGeom>
-        </p:spPr>
-        <p:txBody>
-          <a:bodyPr lIns="0" tIns="0" rIns="0" bIns="0"/>
-          <a:lstStyle>
-            <a:lvl1pPr marL="215900" indent="-215900" algn="l" defTabSz="215900" rtl="0" eaLnBrk="1" fontAlgn="base" hangingPunct="1">
-              <a:spcBef>
-                <a:spcPct val="0"/>
-              </a:spcBef>
-              <a:spcAft>
-                <a:spcPct val="0"/>
-              </a:spcAft>
-              <a:buClr>
-                <a:schemeClr val="tx2"/>
-              </a:buClr>
-              <a:buFont typeface="Arial" panose="020B0604020202020204" pitchFamily="34" charset="0"/>
-              <a:buChar char="•"/>
-              <a:tabLst>
-                <a:tab pos="215900" algn="l"/>
-              </a:tabLst>
-              <a:defRPr kern="1200">
-                <a:solidFill>
-                  <a:schemeClr val="tx1"/>
-                </a:solidFill>
-                <a:latin typeface="Arial" panose="020B0604020202020204" pitchFamily="34" charset="0"/>
-                <a:ea typeface="ＭＳ Ｐゴシック" charset="0"/>
-                <a:cs typeface="Arial" panose="020B0604020202020204" pitchFamily="34" charset="0"/>
-              </a:defRPr>
-            </a:lvl1pPr>
-            <a:lvl2pPr marL="431800" indent="-215900" algn="l" rtl="0" eaLnBrk="1" fontAlgn="base" hangingPunct="1">
-              <a:spcBef>
-                <a:spcPct val="0"/>
-              </a:spcBef>
-              <a:spcAft>
-                <a:spcPct val="0"/>
-              </a:spcAft>
-              <a:buClr>
-                <a:schemeClr val="tx2"/>
-              </a:buClr>
-              <a:buFont typeface="Symbol" panose="05050102010706020507" pitchFamily="18" charset="2"/>
-              <a:buChar char="-"/>
-              <a:tabLst>
-                <a:tab pos="431800" algn="l"/>
-              </a:tabLst>
-              <a:defRPr sz="1600" kern="1200">
-                <a:solidFill>
-                  <a:schemeClr val="tx1"/>
-                </a:solidFill>
-                <a:latin typeface="Arial" panose="020B0604020202020204" pitchFamily="34" charset="0"/>
-                <a:ea typeface="Arial" charset="0"/>
-                <a:cs typeface="Arial" panose="020B0604020202020204" pitchFamily="34" charset="0"/>
-              </a:defRPr>
-            </a:lvl2pPr>
-            <a:lvl3pPr marL="648000" indent="-216000" algn="l" defTabSz="215900" rtl="0" eaLnBrk="1" fontAlgn="base" hangingPunct="1">
-              <a:spcBef>
-                <a:spcPct val="0"/>
-              </a:spcBef>
-              <a:spcAft>
-                <a:spcPct val="0"/>
-              </a:spcAft>
-              <a:buClr>
-                <a:schemeClr val="tx2"/>
-              </a:buClr>
-              <a:buSzPct val="80000"/>
-              <a:buFont typeface="Wingdings" panose="05000000000000000000" pitchFamily="2" charset="2"/>
-              <a:buChar char="§"/>
-              <a:tabLst>
-                <a:tab pos="647700" algn="l"/>
-              </a:tabLst>
-              <a:defRPr sz="1600" kern="1200">
-                <a:solidFill>
-                  <a:schemeClr val="tx1"/>
-                </a:solidFill>
-                <a:latin typeface="Arial" panose="020B0604020202020204" pitchFamily="34" charset="0"/>
-                <a:ea typeface="Arial" charset="0"/>
-                <a:cs typeface="Arial" panose="020B0604020202020204" pitchFamily="34" charset="0"/>
-              </a:defRPr>
-            </a:lvl3pPr>
-            <a:lvl4pPr marL="864000" marR="0" indent="-216000" algn="l" defTabSz="215900" rtl="0" eaLnBrk="1" fontAlgn="base" latinLnBrk="0" hangingPunct="1">
-              <a:lnSpc>
-                <a:spcPct val="100000"/>
-              </a:lnSpc>
-              <a:spcBef>
-                <a:spcPct val="0"/>
-              </a:spcBef>
-              <a:spcAft>
-                <a:spcPct val="0"/>
-              </a:spcAft>
-              <a:buClr>
-                <a:schemeClr val="tx2"/>
-              </a:buClr>
-              <a:buSzPct val="100000"/>
-              <a:buFont typeface="Symbol" panose="05050102010706020507" pitchFamily="18" charset="2"/>
-              <a:buChar char="-"/>
-              <a:tabLst>
-                <a:tab pos="863600" algn="l"/>
-              </a:tabLst>
-              <a:defRPr sz="1600" kern="1200" spc="0" baseline="0">
-                <a:solidFill>
-                  <a:schemeClr val="tx1"/>
-                </a:solidFill>
-                <a:latin typeface="Arial" panose="020B0604020202020204" pitchFamily="34" charset="0"/>
-                <a:ea typeface="Arial" charset="0"/>
-                <a:cs typeface="Arial" panose="020B0604020202020204" pitchFamily="34" charset="0"/>
-              </a:defRPr>
-            </a:lvl4pPr>
-            <a:lvl5pPr marL="863600" indent="-215900" algn="l" rtl="0" eaLnBrk="1" fontAlgn="base" hangingPunct="1">
-              <a:lnSpc>
-                <a:spcPct val="90000"/>
-              </a:lnSpc>
-              <a:spcBef>
-                <a:spcPct val="0"/>
-              </a:spcBef>
-              <a:spcAft>
-                <a:spcPct val="0"/>
-              </a:spcAft>
-              <a:buClr>
-                <a:schemeClr val="tx2"/>
-              </a:buClr>
-              <a:buFont typeface="Arial" panose="020B0604020202020204" pitchFamily="34" charset="0"/>
-              <a:buChar char="-"/>
-              <a:tabLst>
-                <a:tab pos="895350" algn="l"/>
-              </a:tabLst>
-              <a:defRPr sz="1600" kern="1200">
-                <a:solidFill>
-                  <a:schemeClr val="tx1"/>
-                </a:solidFill>
-                <a:latin typeface="Arial" panose="020B0604020202020204" pitchFamily="34" charset="0"/>
-                <a:ea typeface="Arial" charset="0"/>
-                <a:cs typeface="Arial" panose="020B0604020202020204" pitchFamily="34" charset="0"/>
-              </a:defRPr>
-            </a:lvl5pPr>
-            <a:lvl6pPr marL="2514600" indent="-228600" algn="l" defTabSz="914400" rtl="0" eaLnBrk="1" latinLnBrk="0" hangingPunct="1">
-              <a:lnSpc>
-                <a:spcPct val="90000"/>
-              </a:lnSpc>
-              <a:spcBef>
-                <a:spcPts val="500"/>
-              </a:spcBef>
-              <a:buFont typeface="Arial" panose="020B0604020202020204" pitchFamily="34" charset="0"/>
-              <a:buChar char="•"/>
-              <a:defRPr sz="1800" kern="1200">
-                <a:solidFill>
-                  <a:schemeClr val="tx1"/>
-                </a:solidFill>
-                <a:latin typeface="+mn-lt"/>
-                <a:ea typeface="+mn-ea"/>
-                <a:cs typeface="+mn-cs"/>
-              </a:defRPr>
-            </a:lvl6pPr>
-            <a:lvl7pPr marL="2971800" indent="-228600" algn="l" defTabSz="914400" rtl="0" eaLnBrk="1" latinLnBrk="0" hangingPunct="1">
-              <a:lnSpc>
-                <a:spcPct val="90000"/>
-              </a:lnSpc>
-              <a:spcBef>
-                <a:spcPts val="500"/>
-              </a:spcBef>
-              <a:buFont typeface="Arial" panose="020B0604020202020204" pitchFamily="34" charset="0"/>
-              <a:buChar char="•"/>
-              <a:defRPr sz="1800" kern="1200">
-                <a:solidFill>
-                  <a:schemeClr val="tx1"/>
-                </a:solidFill>
-                <a:latin typeface="+mn-lt"/>
-                <a:ea typeface="+mn-ea"/>
-                <a:cs typeface="+mn-cs"/>
-              </a:defRPr>
-            </a:lvl7pPr>
-            <a:lvl8pPr marL="3429000" indent="-228600" algn="l" defTabSz="914400" rtl="0" eaLnBrk="1" latinLnBrk="0" hangingPunct="1">
-              <a:lnSpc>
-                <a:spcPct val="90000"/>
-              </a:lnSpc>
-              <a:spcBef>
-                <a:spcPts val="500"/>
-              </a:spcBef>
-              <a:buFont typeface="Arial" panose="020B0604020202020204" pitchFamily="34" charset="0"/>
-              <a:buChar char="•"/>
-              <a:defRPr sz="1800" kern="1200">
-                <a:solidFill>
-                  <a:schemeClr val="tx1"/>
-                </a:solidFill>
-                <a:latin typeface="+mn-lt"/>
-                <a:ea typeface="+mn-ea"/>
-                <a:cs typeface="+mn-cs"/>
-              </a:defRPr>
-            </a:lvl8pPr>
-            <a:lvl9pPr marL="3886200" indent="-228600" algn="l" defTabSz="914400" rtl="0" eaLnBrk="1" latinLnBrk="0" hangingPunct="1">
-              <a:lnSpc>
-                <a:spcPct val="90000"/>
-              </a:lnSpc>
-              <a:spcBef>
-                <a:spcPts val="500"/>
-              </a:spcBef>
-              <a:buFont typeface="Arial" panose="020B0604020202020204" pitchFamily="34" charset="0"/>
-              <a:buChar char="•"/>
-              <a:defRPr sz="1800" kern="1200">
-                <a:solidFill>
-                  <a:schemeClr val="tx1"/>
-                </a:solidFill>
-                <a:latin typeface="+mn-lt"/>
-                <a:ea typeface="+mn-ea"/>
-                <a:cs typeface="+mn-cs"/>
-              </a:defRPr>
-            </a:lvl9pPr>
-          </a:lstStyle>
-          <a:p>
-            <a:r>
-              <a:rPr lang="de-DE"/>
-              <a:t>Improved Typechecking</a:t>
-            </a:r>
-          </a:p>
-          <a:p>
-            <a:endParaRPr lang="de-DE"/>
-          </a:p>
-          <a:p>
-            <a:r>
-              <a:rPr lang="en-GB"/>
-              <a:t>Optionals</a:t>
-            </a:r>
-          </a:p>
-          <a:p>
-            <a:endParaRPr lang="en-GB"/>
-          </a:p>
-          <a:p>
-            <a:r>
-              <a:rPr lang="de-DE"/>
-              <a:t>Named Tupels as a shortcut for classes</a:t>
-            </a:r>
-            <a:endParaRPr lang="en-GB"/>
-          </a:p>
-          <a:p>
-            <a:endParaRPr lang="en-GB"/>
-          </a:p>
-          <a:p>
-            <a:r>
-              <a:rPr lang="en-GB"/>
-              <a:t>Code Inclusion</a:t>
-            </a:r>
-          </a:p>
-          <a:p>
-            <a:endParaRPr lang="en-GB"/>
-          </a:p>
-          <a:p>
-            <a:r>
-              <a:rPr lang="en-GB"/>
-              <a:t>Well Structured Output</a:t>
-            </a:r>
-          </a:p>
-          <a:p>
-            <a:endParaRPr lang="en-GB"/>
-          </a:p>
-          <a:p>
-            <a:r>
-              <a:rPr lang="en-GB"/>
-              <a:t>Predefined libraries</a:t>
-            </a:r>
-          </a:p>
-          <a:p>
-            <a:pPr lvl="1"/>
-            <a:r>
-              <a:rPr lang="en-GB"/>
-              <a:t>Map/Reduce </a:t>
-            </a:r>
-          </a:p>
-          <a:p>
-            <a:endParaRPr lang="en-GB"/>
-          </a:p>
-          <a:p>
-            <a:r>
-              <a:rPr lang="en-GB"/>
-              <a:t>More Parallel Execution</a:t>
-            </a:r>
-          </a:p>
-          <a:p>
-            <a:pPr lvl="1"/>
-            <a:r>
-              <a:rPr lang="en-GB"/>
-              <a:t>Loop Parallelization</a:t>
-            </a:r>
-          </a:p>
-          <a:p>
-            <a:pPr lvl="1"/>
-            <a:r>
-              <a:rPr lang="en-GB"/>
-              <a:t>GPU Support</a:t>
-            </a:r>
-          </a:p>
-          <a:p>
-            <a:pPr lvl="1"/>
-            <a:endParaRPr lang="en-GB" dirty="0"/>
-          </a:p>
-        </p:txBody>
-      </p:sp>
       <p:grpSp>
         <p:nvGrpSpPr>
           <p:cNvPr id="11" name="Gruppieren 10">
@@ -7372,11 +7065,11 @@
           <a:p>
             <a:r>
               <a:rPr lang="de-DE" dirty="0"/>
-              <a:t>Imperativ </a:t>
+              <a:t>Imperative </a:t>
             </a:r>
             <a:r>
               <a:rPr lang="en-GB" dirty="0"/>
-              <a:t>Programming Languages (e.g. </a:t>
+              <a:t>programming languages (e.g. </a:t>
             </a:r>
             <a:r>
               <a:rPr lang="de-DE" dirty="0"/>
@@ -7387,64 +7080,77 @@
             <a:pPr lvl="1"/>
             <a:r>
               <a:rPr lang="de-DE" dirty="0"/>
-              <a:t>Possible Side </a:t>
+              <a:t>Possible </a:t>
             </a:r>
             <a:r>
               <a:rPr lang="de-DE" dirty="0" err="1"/>
-              <a:t>Effects</a:t>
+              <a:t>side</a:t>
             </a:r>
             <a:r>
               <a:rPr lang="de-DE" dirty="0"/>
               <a:t> </a:t>
             </a:r>
+            <a:r>
+              <a:rPr lang="de-DE" dirty="0" err="1"/>
+              <a:t>effects</a:t>
+            </a:r>
+            <a:r>
+              <a:rPr lang="de-DE" dirty="0"/>
+              <a:t> </a:t>
+            </a:r>
           </a:p>
           <a:p>
             <a:pPr lvl="1"/>
             <a:r>
               <a:rPr lang="de-DE" dirty="0"/>
-              <a:t>Code Efficiency </a:t>
+              <a:t>Code </a:t>
             </a:r>
             <a:r>
               <a:rPr lang="de-DE" dirty="0" err="1"/>
-              <a:t>Depents</a:t>
+              <a:t>efficiency</a:t>
             </a:r>
             <a:r>
               <a:rPr lang="de-DE" dirty="0"/>
-              <a:t> on User</a:t>
-            </a:r>
-          </a:p>
-          <a:p>
+              <a:t> </a:t>
+            </a:r>
+            <a:r>
+              <a:rPr lang="de-DE" dirty="0" err="1"/>
+              <a:t>depends</a:t>
+            </a:r>
+            <a:r>
+              <a:rPr lang="de-DE" dirty="0"/>
+              <a:t> on </a:t>
+            </a:r>
+            <a:r>
+              <a:rPr lang="de-DE" dirty="0" err="1"/>
+              <a:t>user</a:t>
+            </a:r>
             <a:endParaRPr lang="de-DE" dirty="0"/>
           </a:p>
           <a:p>
             <a:endParaRPr lang="de-DE" dirty="0"/>
           </a:p>
           <a:p>
+            <a:endParaRPr lang="de-DE" dirty="0"/>
+          </a:p>
+          <a:p>
             <a:r>
               <a:rPr lang="en-GB" dirty="0"/>
-              <a:t>Functional Programming Languages (e.g. Haskell)</a:t>
+              <a:t>Functional programming languages (e.g. Haskell)</a:t>
             </a:r>
           </a:p>
           <a:p>
             <a:pPr lvl="1"/>
             <a:r>
               <a:rPr lang="en-GB" dirty="0"/>
-              <a:t>No Side Effects</a:t>
+              <a:t>No side effects</a:t>
             </a:r>
           </a:p>
           <a:p>
             <a:pPr lvl="1"/>
             <a:r>
               <a:rPr lang="en-GB" dirty="0"/>
-              <a:t>Code Efficiency </a:t>
-            </a:r>
-            <a:r>
-              <a:rPr lang="en-GB" dirty="0" err="1"/>
-              <a:t>Depents</a:t>
-            </a:r>
-            <a:r>
-              <a:rPr lang="en-GB" dirty="0"/>
-              <a:t> on Compiler</a:t>
+              <a:t>Code efficiency depends on compiler</a:t>
             </a:r>
           </a:p>
           <a:p>
@@ -7510,15 +7216,23 @@
           <a:p>
             <a:r>
               <a:rPr lang="de-DE" dirty="0"/>
-              <a:t>Imperativ Pure </a:t>
+              <a:t>Imperative pure </a:t>
             </a:r>
             <a:r>
               <a:rPr lang="de-DE" dirty="0" err="1"/>
-              <a:t>Programming</a:t>
+              <a:t>programming</a:t>
             </a:r>
             <a:r>
               <a:rPr lang="de-DE" dirty="0"/>
-              <a:t> Language (</a:t>
+              <a:t> </a:t>
+            </a:r>
+            <a:r>
+              <a:rPr lang="de-DE" dirty="0" err="1"/>
+              <a:t>language</a:t>
+            </a:r>
+            <a:r>
+              <a:rPr lang="de-DE" dirty="0"/>
+              <a:t> (</a:t>
             </a:r>
             <a:r>
               <a:rPr lang="de-DE" dirty="0" err="1"/>
@@ -7533,7 +7247,7 @@
             <a:pPr lvl="1"/>
             <a:r>
               <a:rPr lang="en-GB" dirty="0"/>
-              <a:t>No Side Effects</a:t>
+              <a:t>No side effects</a:t>
             </a:r>
           </a:p>
           <a:p>
@@ -7544,15 +7258,27 @@
             <a:pPr lvl="1"/>
             <a:r>
               <a:rPr lang="de-DE" dirty="0"/>
-              <a:t>Code Efficiency </a:t>
+              <a:t>Code </a:t>
             </a:r>
             <a:r>
               <a:rPr lang="de-DE" dirty="0" err="1"/>
-              <a:t>Depents</a:t>
+              <a:t>efficiency</a:t>
             </a:r>
             <a:r>
               <a:rPr lang="de-DE" dirty="0"/>
-              <a:t> on User</a:t>
+              <a:t> </a:t>
+            </a:r>
+            <a:r>
+              <a:rPr lang="de-DE" dirty="0" err="1"/>
+              <a:t>depends</a:t>
+            </a:r>
+            <a:r>
+              <a:rPr lang="de-DE" dirty="0"/>
+              <a:t> on </a:t>
+            </a:r>
+            <a:r>
+              <a:rPr lang="de-DE" dirty="0" err="1"/>
+              <a:t>user</a:t>
             </a:r>
             <a:endParaRPr lang="de-DE" i="1" dirty="0"/>
           </a:p>
@@ -7989,7 +7715,7 @@
           <a:p>
             <a:r>
               <a:rPr lang="de-DE" dirty="0" err="1"/>
-              <a:t>Difficulties</a:t>
+              <a:t>Challenges</a:t>
             </a:r>
             <a:endParaRPr lang="de-DE" dirty="0"/>
           </a:p>
@@ -8106,7 +7832,7 @@
             </a:r>
             <a:r>
               <a:rPr lang="de-DE" dirty="0" err="1"/>
-              <a:t>Functions</a:t>
+              <a:t>functions</a:t>
             </a:r>
             <a:endParaRPr lang="de-DE" dirty="0"/>
           </a:p>
@@ -8118,11 +7844,47 @@
             </a:r>
             <a:r>
               <a:rPr lang="de-DE" dirty="0"/>
-              <a:t> Side </a:t>
+              <a:t> </a:t>
             </a:r>
             <a:r>
               <a:rPr lang="de-DE" dirty="0" err="1"/>
-              <a:t>Effects</a:t>
+              <a:t>side</a:t>
+            </a:r>
+            <a:r>
+              <a:rPr lang="de-DE" dirty="0"/>
+              <a:t> </a:t>
+            </a:r>
+            <a:r>
+              <a:rPr lang="de-DE" dirty="0" err="1"/>
+              <a:t>effects</a:t>
+            </a:r>
+            <a:endParaRPr lang="de-DE" dirty="0"/>
+          </a:p>
+          <a:p>
+            <a:pPr lvl="1"/>
+            <a:r>
+              <a:rPr lang="de-DE" dirty="0"/>
+              <a:t>Well </a:t>
+            </a:r>
+            <a:r>
+              <a:rPr lang="de-DE" dirty="0" err="1"/>
+              <a:t>suited</a:t>
+            </a:r>
+            <a:r>
+              <a:rPr lang="de-DE" dirty="0"/>
+              <a:t> </a:t>
+            </a:r>
+            <a:r>
+              <a:rPr lang="de-DE" dirty="0" err="1"/>
+              <a:t>for</a:t>
+            </a:r>
+            <a:r>
+              <a:rPr lang="de-DE" dirty="0"/>
+              <a:t> </a:t>
+            </a:r>
+            <a:r>
+              <a:rPr lang="de-DE" dirty="0" err="1"/>
+              <a:t>parallelism</a:t>
             </a:r>
             <a:endParaRPr lang="de-DE" dirty="0"/>
           </a:p>
@@ -8133,6 +7895,24 @@
           <a:p>
             <a:r>
               <a:rPr lang="de-DE" dirty="0" err="1"/>
+              <a:t>Built</a:t>
+            </a:r>
+            <a:r>
+              <a:rPr lang="de-DE" dirty="0"/>
+              <a:t>-in parallel </a:t>
+            </a:r>
+            <a:r>
+              <a:rPr lang="de-DE" dirty="0" err="1"/>
+              <a:t>features</a:t>
+            </a:r>
+            <a:endParaRPr lang="de-DE" dirty="0"/>
+          </a:p>
+          <a:p>
+            <a:endParaRPr lang="de-DE" dirty="0"/>
+          </a:p>
+          <a:p>
+            <a:r>
+              <a:rPr lang="de-DE" dirty="0" err="1"/>
               <a:t>Readability</a:t>
             </a:r>
             <a:r>
@@ -8141,7 +7921,7 @@
             </a:r>
             <a:r>
               <a:rPr lang="de-DE" dirty="0" err="1"/>
-              <a:t>Similar</a:t>
+              <a:t>similar</a:t>
             </a:r>
             <a:r>
               <a:rPr lang="de-DE" dirty="0"/>
@@ -8162,46 +7942,31 @@
           <a:p>
             <a:r>
               <a:rPr lang="de-DE" dirty="0"/>
-              <a:t>C++ Performance (Control)</a:t>
-            </a:r>
-          </a:p>
-          <a:p>
-            <a:pPr lvl="1"/>
+              <a:t>C++ </a:t>
+            </a:r>
             <a:r>
               <a:rPr lang="de-DE" dirty="0" err="1"/>
-              <a:t>Parsed</a:t>
+              <a:t>performance</a:t>
             </a:r>
             <a:r>
               <a:rPr lang="de-DE" dirty="0"/>
               <a:t> </a:t>
             </a:r>
-            <a:r>
-              <a:rPr lang="de-DE" dirty="0" err="1"/>
-              <a:t>to</a:t>
-            </a:r>
+          </a:p>
+          <a:p>
+            <a:pPr lvl="1"/>
             <a:r>
               <a:rPr lang="de-DE" dirty="0"/>
-              <a:t> </a:t>
-            </a:r>
-            <a:r>
-              <a:rPr lang="de-DE" dirty="0" err="1"/>
-              <a:t>Equivalent</a:t>
-            </a:r>
+              <a:t>Generates C++ source code</a:t>
+            </a:r>
+          </a:p>
+          <a:p>
+            <a:endParaRPr lang="de-DE" dirty="0"/>
+          </a:p>
+          <a:p>
             <a:r>
               <a:rPr lang="de-DE" dirty="0"/>
-              <a:t> C++ Source Code</a:t>
-            </a:r>
-          </a:p>
-          <a:p>
-            <a:pPr marL="216000" lvl="1" indent="0">
-              <a:buNone/>
-            </a:pPr>
-            <a:endParaRPr lang="de-DE" dirty="0"/>
-          </a:p>
-          <a:p>
-            <a:r>
-              <a:rPr lang="de-DE" dirty="0"/>
-              <a:t>Common Feature Support</a:t>
+              <a:t>Common feature support</a:t>
             </a:r>
           </a:p>
           <a:p>
@@ -8216,21 +7981,20 @@
           </a:p>
           <a:p>
             <a:r>
+              <a:rPr lang="de-DE" dirty="0"/>
+              <a:t>Turing </a:t>
+            </a:r>
+            <a:r>
               <a:rPr lang="de-DE" dirty="0" err="1"/>
-              <a:t>No</a:t>
+              <a:t>complete</a:t>
             </a:r>
             <a:r>
               <a:rPr lang="de-DE" dirty="0"/>
-              <a:t> DSL but Turing </a:t>
-            </a:r>
-            <a:r>
-              <a:rPr lang="de-DE" dirty="0" err="1"/>
-              <a:t>Complete</a:t>
-            </a:r>
-            <a:r>
-              <a:rPr lang="de-DE" dirty="0"/>
-              <a:t> Language</a:t>
-            </a:r>
+              <a:t> DSL</a:t>
+            </a:r>
+          </a:p>
+          <a:p>
+            <a:endParaRPr lang="de-DE" dirty="0"/>
           </a:p>
           <a:p>
             <a:pPr lvl="1"/>
@@ -8865,21 +8629,7 @@
                   <a:latin typeface="Courier New" pitchFamily="49" charset="0"/>
                   <a:cs typeface="Courier New" pitchFamily="49" charset="0"/>
                 </a:rPr>
-                <a:t>  </a:t>
-              </a:r>
-              <a:r>
-                <a:rPr lang="en-US" b="1" dirty="0" err="1">
-                  <a:latin typeface="Courier New" pitchFamily="49" charset="0"/>
-                  <a:cs typeface="Courier New" pitchFamily="49" charset="0"/>
-                </a:rPr>
-                <a:t>tupel</a:t>
-              </a:r>
-              <a:r>
-                <a:rPr lang="en-US" b="1" dirty="0">
-                  <a:latin typeface="Courier New" pitchFamily="49" charset="0"/>
-                  <a:cs typeface="Courier New" pitchFamily="49" charset="0"/>
-                </a:rPr>
-                <a:t> &lt;Int, String&gt; = &lt;1, “</a:t>
+                <a:t>  tuple &lt;Int, String&gt; = &lt;1, “</a:t>
               </a:r>
               <a:r>
                 <a:rPr lang="en-US" b="1" dirty="0" err="1">
@@ -9267,7 +9017,23 @@
                   <a:schemeClr val="tx2"/>
                 </a:solidFill>
               </a:rPr>
-              <a:t>8 Bit Integer</a:t>
+              <a:t>8 </a:t>
+            </a:r>
+            <a:r>
+              <a:rPr lang="de-DE" dirty="0" err="1">
+                <a:solidFill>
+                  <a:schemeClr val="tx2"/>
+                </a:solidFill>
+              </a:rPr>
+              <a:t>bit</a:t>
+            </a:r>
+            <a:r>
+              <a:rPr lang="de-DE" dirty="0">
+                <a:solidFill>
+                  <a:schemeClr val="tx2"/>
+                </a:solidFill>
+              </a:rPr>
+              <a:t> integer</a:t>
             </a:r>
             <a:endParaRPr lang="en-GB" dirty="0">
               <a:solidFill>
@@ -9353,7 +9119,23 @@
                   <a:schemeClr val="tx2"/>
                 </a:solidFill>
               </a:rPr>
-              <a:t>Optional Colon </a:t>
+              <a:t>Optional </a:t>
+            </a:r>
+            <a:r>
+              <a:rPr lang="de-DE" dirty="0" err="1">
+                <a:solidFill>
+                  <a:schemeClr val="tx2"/>
+                </a:solidFill>
+              </a:rPr>
+              <a:t>colon</a:t>
+            </a:r>
+            <a:r>
+              <a:rPr lang="de-DE" dirty="0">
+                <a:solidFill>
+                  <a:schemeClr val="tx2"/>
+                </a:solidFill>
+              </a:rPr>
+              <a:t> </a:t>
             </a:r>
             <a:endParaRPr lang="en-GB" dirty="0">
               <a:solidFill>
@@ -9441,7 +9223,15 @@
                   <a:schemeClr val="tx2"/>
                 </a:solidFill>
               </a:rPr>
-              <a:t>Variable Name</a:t>
+              <a:t>Variable </a:t>
+            </a:r>
+            <a:r>
+              <a:rPr lang="de-DE" dirty="0" err="1">
+                <a:solidFill>
+                  <a:schemeClr val="tx2"/>
+                </a:solidFill>
+              </a:rPr>
+              <a:t>name</a:t>
             </a:r>
             <a:endParaRPr lang="en-GB" dirty="0">
               <a:solidFill>
@@ -9526,7 +9316,7 @@
                   <a:schemeClr val="tx2"/>
                 </a:solidFill>
               </a:rPr>
-              <a:t>Variable Type</a:t>
+              <a:t>Variable type</a:t>
             </a:r>
             <a:endParaRPr lang="en-GB" dirty="0">
               <a:solidFill>
@@ -9619,7 +9409,15 @@
                   <a:schemeClr val="tx2"/>
                 </a:solidFill>
               </a:rPr>
-              <a:t> Declaration</a:t>
+              <a:t> </a:t>
+            </a:r>
+            <a:r>
+              <a:rPr lang="de-DE" dirty="0" err="1">
+                <a:solidFill>
+                  <a:schemeClr val="tx2"/>
+                </a:solidFill>
+              </a:rPr>
+              <a:t>declaration</a:t>
             </a:r>
             <a:endParaRPr lang="en-GB" dirty="0">
               <a:solidFill>
@@ -9721,7 +9519,7 @@
                   <a:schemeClr val="tx2"/>
                 </a:solidFill>
               </a:rPr>
-              <a:t>Instantiation</a:t>
+              <a:t>instantiation</a:t>
             </a:r>
             <a:endParaRPr lang="en-GB" dirty="0">
               <a:solidFill>
@@ -9801,12 +9599,28 @@
           <a:lstStyle/>
           <a:p>
             <a:r>
+              <a:rPr lang="de-DE" dirty="0" err="1">
+                <a:solidFill>
+                  <a:schemeClr val="tx2"/>
+                </a:solidFill>
+              </a:rPr>
+              <a:t>Tuple</a:t>
+            </a:r>
+            <a:r>
               <a:rPr lang="de-DE" dirty="0">
                 <a:solidFill>
                   <a:schemeClr val="tx2"/>
                 </a:solidFill>
               </a:rPr>
-              <a:t>Tupel Declaration</a:t>
+              <a:t> </a:t>
+            </a:r>
+            <a:r>
+              <a:rPr lang="de-DE" dirty="0" err="1">
+                <a:solidFill>
+                  <a:schemeClr val="tx2"/>
+                </a:solidFill>
+              </a:rPr>
+              <a:t>declaration</a:t>
             </a:r>
             <a:endParaRPr lang="en-GB" dirty="0">
               <a:solidFill>
@@ -9887,12 +9701,20 @@
           <a:lstStyle/>
           <a:p>
             <a:r>
+              <a:rPr lang="de-DE" dirty="0" err="1">
+                <a:solidFill>
+                  <a:schemeClr val="tx2"/>
+                </a:solidFill>
+              </a:rPr>
+              <a:t>Tuple</a:t>
+            </a:r>
+            <a:r>
               <a:rPr lang="de-DE" dirty="0">
                 <a:solidFill>
                   <a:schemeClr val="tx2"/>
                 </a:solidFill>
               </a:rPr>
-              <a:t>Tupel </a:t>
+              <a:t> </a:t>
             </a:r>
             <a:r>
               <a:rPr lang="de-DE" dirty="0" err="1">
@@ -9900,7 +9722,7 @@
                   <a:schemeClr val="tx2"/>
                 </a:solidFill>
               </a:rPr>
-              <a:t>Instantiation</a:t>
+              <a:t>instantiation</a:t>
             </a:r>
             <a:endParaRPr lang="en-GB" dirty="0">
               <a:solidFill>
@@ -9988,7 +9810,15 @@
                   <a:schemeClr val="tx2"/>
                 </a:solidFill>
               </a:rPr>
-              <a:t>List Declaration</a:t>
+              <a:t>List </a:t>
+            </a:r>
+            <a:r>
+              <a:rPr lang="de-DE" dirty="0" err="1">
+                <a:solidFill>
+                  <a:schemeClr val="tx2"/>
+                </a:solidFill>
+              </a:rPr>
+              <a:t>declaration</a:t>
             </a:r>
             <a:endParaRPr lang="en-GB" dirty="0">
               <a:solidFill>
@@ -10082,7 +9912,7 @@
                   <a:schemeClr val="tx2"/>
                 </a:solidFill>
               </a:rPr>
-              <a:t>Instantiation</a:t>
+              <a:t>instantiation</a:t>
             </a:r>
             <a:endParaRPr lang="en-GB" dirty="0">
               <a:solidFill>
@@ -11472,7 +11302,7 @@
                   <a:schemeClr val="tx2"/>
                 </a:solidFill>
               </a:rPr>
-              <a:t> Type Student </a:t>
+              <a:t> type Student </a:t>
             </a:r>
             <a:endParaRPr lang="en-GB" dirty="0">
               <a:solidFill>
@@ -11561,7 +11391,15 @@
                   <a:schemeClr val="tx2"/>
                 </a:solidFill>
               </a:rPr>
-              <a:t>Class Keyword</a:t>
+              <a:t>Class </a:t>
+            </a:r>
+            <a:r>
+              <a:rPr lang="de-DE" dirty="0" err="1">
+                <a:solidFill>
+                  <a:schemeClr val="tx2"/>
+                </a:solidFill>
+              </a:rPr>
+              <a:t>keyword</a:t>
             </a:r>
             <a:endParaRPr lang="en-GB" dirty="0">
               <a:solidFill>
@@ -11647,7 +11485,15 @@
                   <a:schemeClr val="tx2"/>
                 </a:solidFill>
               </a:rPr>
-              <a:t>Class Name</a:t>
+              <a:t>Class </a:t>
+            </a:r>
+            <a:r>
+              <a:rPr lang="de-DE" dirty="0" err="1">
+                <a:solidFill>
+                  <a:schemeClr val="tx2"/>
+                </a:solidFill>
+              </a:rPr>
+              <a:t>name</a:t>
             </a:r>
             <a:endParaRPr lang="en-GB" dirty="0">
               <a:solidFill>
@@ -11743,7 +11589,15 @@
                   <a:schemeClr val="tx2"/>
                 </a:solidFill>
               </a:rPr>
-              <a:t> Call</a:t>
+              <a:t> </a:t>
+            </a:r>
+            <a:r>
+              <a:rPr lang="de-DE" dirty="0" err="1">
+                <a:solidFill>
+                  <a:schemeClr val="tx2"/>
+                </a:solidFill>
+              </a:rPr>
+              <a:t>call</a:t>
             </a:r>
             <a:endParaRPr lang="en-GB" dirty="0">
               <a:solidFill>
@@ -12969,7 +12823,15 @@
                   <a:schemeClr val="tx2"/>
                 </a:solidFill>
               </a:rPr>
-              <a:t> Brackets</a:t>
+              <a:t> </a:t>
+            </a:r>
+            <a:r>
+              <a:rPr lang="de-DE" dirty="0" err="1">
+                <a:solidFill>
+                  <a:schemeClr val="tx2"/>
+                </a:solidFill>
+              </a:rPr>
+              <a:t>brackets</a:t>
             </a:r>
             <a:endParaRPr lang="en-GB" dirty="0">
               <a:solidFill>
@@ -13079,7 +12941,7 @@
                   <a:schemeClr val="tx2"/>
                 </a:solidFill>
               </a:rPr>
-              <a:t> Loop</a:t>
+              <a:t> loop</a:t>
             </a:r>
             <a:endParaRPr lang="en-GB" dirty="0">
               <a:solidFill>
@@ -13165,7 +13027,7 @@
                   <a:schemeClr val="tx2"/>
                 </a:solidFill>
               </a:rPr>
-              <a:t>Return Type</a:t>
+              <a:t>Return type</a:t>
             </a:r>
             <a:endParaRPr lang="en-GB" dirty="0">
               <a:solidFill>
@@ -13250,7 +13112,15 @@
                   <a:schemeClr val="tx2"/>
                 </a:solidFill>
               </a:rPr>
-              <a:t>Parameter List</a:t>
+              <a:t>Parameter </a:t>
+            </a:r>
+            <a:r>
+              <a:rPr lang="de-DE" dirty="0" err="1">
+                <a:solidFill>
+                  <a:schemeClr val="tx2"/>
+                </a:solidFill>
+              </a:rPr>
+              <a:t>list</a:t>
             </a:r>
             <a:endParaRPr lang="en-GB" dirty="0">
               <a:solidFill>
@@ -13343,7 +13213,15 @@
                   <a:schemeClr val="tx2"/>
                 </a:solidFill>
               </a:rPr>
-              <a:t> Name</a:t>
+              <a:t> </a:t>
+            </a:r>
+            <a:r>
+              <a:rPr lang="de-DE" dirty="0" err="1">
+                <a:solidFill>
+                  <a:schemeClr val="tx2"/>
+                </a:solidFill>
+              </a:rPr>
+              <a:t>name</a:t>
             </a:r>
             <a:endParaRPr lang="en-GB" dirty="0">
               <a:solidFill>
@@ -13436,7 +13314,7 @@
                   <a:schemeClr val="tx2"/>
                 </a:solidFill>
               </a:rPr>
-              <a:t>concatination</a:t>
+              <a:t>concatenation</a:t>
             </a:r>
             <a:endParaRPr lang="en-GB" dirty="0">
               <a:solidFill>
@@ -14310,7 +14188,7 @@
             </a:r>
             <a:r>
               <a:rPr lang="de-DE" dirty="0" err="1"/>
-              <a:t>Execution</a:t>
+              <a:t>execution</a:t>
             </a:r>
             <a:endParaRPr lang="de-DE" dirty="0"/>
           </a:p>
@@ -14326,7 +14204,7 @@
             </a:r>
             <a:r>
               <a:rPr lang="de-DE" dirty="0" err="1"/>
-              <a:t>Implicit</a:t>
+              <a:t>implicit</a:t>
             </a:r>
             <a:r>
               <a:rPr lang="de-DE" dirty="0"/>
@@ -14334,7 +14212,7 @@
             </a:r>
             <a:r>
               <a:rPr lang="de-DE" dirty="0" err="1"/>
-              <a:t>Barriers</a:t>
+              <a:t>barriers</a:t>
             </a:r>
             <a:r>
               <a:rPr lang="de-DE" dirty="0"/>
@@ -14350,15 +14228,23 @@
             </a:r>
             <a:r>
               <a:rPr lang="de-DE" dirty="0" err="1"/>
-              <a:t>Avoid</a:t>
+              <a:t>avoid</a:t>
             </a:r>
             <a:r>
               <a:rPr lang="de-DE" dirty="0"/>
-              <a:t> Data </a:t>
+              <a:t> </a:t>
             </a:r>
             <a:r>
               <a:rPr lang="de-DE" dirty="0" err="1"/>
-              <a:t>Races</a:t>
+              <a:t>data</a:t>
+            </a:r>
+            <a:r>
+              <a:rPr lang="de-DE" dirty="0"/>
+              <a:t> </a:t>
+            </a:r>
+            <a:r>
+              <a:rPr lang="de-DE" dirty="0" err="1"/>
+              <a:t>races</a:t>
             </a:r>
             <a:endParaRPr lang="de-DE" dirty="0"/>
           </a:p>
@@ -14667,7 +14553,16 @@
                   <a:latin typeface="Courier New" pitchFamily="49" charset="0"/>
                   <a:cs typeface="Courier New" pitchFamily="49" charset="0"/>
                 </a:rPr>
-                <a:t>    </a:t>
+                <a:t>    }</a:t>
+              </a:r>
+            </a:p>
+            <a:p>
+              <a:r>
+                <a:rPr lang="en-US" b="1" dirty="0">
+                  <a:latin typeface="Courier New" pitchFamily="49" charset="0"/>
+                  <a:cs typeface="Courier New" pitchFamily="49" charset="0"/>
+                </a:rPr>
+                <a:t>  </a:t>
               </a:r>
               <a:r>
                 <a:rPr lang="en-US" b="1" dirty="0">
@@ -14678,15 +14573,6 @@
                   <a:cs typeface="Courier New" pitchFamily="49" charset="0"/>
                 </a:rPr>
                 <a:t>}</a:t>
-              </a:r>
-            </a:p>
-            <a:p>
-              <a:r>
-                <a:rPr lang="en-US" b="1" dirty="0">
-                  <a:latin typeface="Courier New" pitchFamily="49" charset="0"/>
-                  <a:cs typeface="Courier New" pitchFamily="49" charset="0"/>
-                </a:rPr>
-                <a:t>  }</a:t>
               </a:r>
             </a:p>
             <a:p>
@@ -14997,7 +14883,15 @@
                   <a:schemeClr val="tx2"/>
                 </a:solidFill>
               </a:rPr>
-              <a:t> Call</a:t>
+              <a:t> </a:t>
+            </a:r>
+            <a:r>
+              <a:rPr lang="de-DE" dirty="0" err="1">
+                <a:solidFill>
+                  <a:schemeClr val="tx2"/>
+                </a:solidFill>
+              </a:rPr>
+              <a:t>call</a:t>
             </a:r>
             <a:endParaRPr lang="en-GB" dirty="0">
               <a:solidFill>
@@ -15049,7 +14943,7 @@
                   <a:schemeClr val="tx2"/>
                 </a:solidFill>
               </a:rPr>
-              <a:t> Block</a:t>
+              <a:t> block</a:t>
             </a:r>
             <a:endParaRPr lang="en-GB" dirty="0">
               <a:solidFill>
@@ -15374,8 +15268,13 @@
           <a:p>
             <a:r>
               <a:rPr lang="de-DE" dirty="0"/>
-              <a:t>Type Checking</a:t>
-            </a:r>
+              <a:t>Type </a:t>
+            </a:r>
+            <a:r>
+              <a:rPr lang="de-DE" dirty="0" err="1"/>
+              <a:t>checking</a:t>
+            </a:r>
+            <a:endParaRPr lang="de-DE" dirty="0"/>
           </a:p>
           <a:p>
             <a:endParaRPr lang="de-DE" dirty="0"/>
@@ -15394,12 +15293,17 @@
             </a:r>
             <a:r>
               <a:rPr lang="de-DE" dirty="0" err="1"/>
-              <a:t>Barrier</a:t>
+              <a:t>barrier</a:t>
             </a:r>
             <a:r>
               <a:rPr lang="de-DE" dirty="0"/>
-              <a:t> Construction</a:t>
-            </a:r>
+              <a:t> </a:t>
+            </a:r>
+            <a:r>
+              <a:rPr lang="de-DE" dirty="0" err="1"/>
+              <a:t>construction</a:t>
+            </a:r>
+            <a:endParaRPr lang="de-DE" dirty="0"/>
           </a:p>
           <a:p>
             <a:endParaRPr lang="de-DE" dirty="0"/>
@@ -15414,7 +15318,15 @@
             </a:r>
             <a:r>
               <a:rPr lang="de-DE" dirty="0"/>
-              <a:t> Container Variables</a:t>
+              <a:t> </a:t>
+            </a:r>
+            <a:r>
+              <a:rPr lang="en-US" dirty="0"/>
+              <a:t>container</a:t>
+            </a:r>
+            <a:r>
+              <a:rPr lang="de-DE" dirty="0"/>
+              <a:t> variables</a:t>
             </a:r>
           </a:p>
           <a:p>
@@ -15425,7 +15337,7 @@
             </a:r>
             <a:r>
               <a:rPr lang="de-DE" dirty="0" err="1"/>
-              <a:t>Parsed</a:t>
+              <a:t>parsed</a:t>
             </a:r>
             <a:r>
               <a:rPr lang="de-DE" dirty="0"/>
@@ -15441,12 +15353,17 @@
             </a:r>
             <a:r>
               <a:rPr lang="de-DE" dirty="0" err="1"/>
-              <a:t>Function</a:t>
+              <a:t>function</a:t>
             </a:r>
             <a:r>
               <a:rPr lang="de-DE" dirty="0"/>
-              <a:t> Calls</a:t>
-            </a:r>
+              <a:t> </a:t>
+            </a:r>
+            <a:r>
+              <a:rPr lang="de-DE" dirty="0" err="1"/>
+              <a:t>calls</a:t>
+            </a:r>
+            <a:endParaRPr lang="de-DE" dirty="0"/>
           </a:p>
           <a:p>
             <a:pPr marL="215900" lvl="1" indent="0">
@@ -15470,7 +15387,7 @@
             </a:r>
             <a:r>
               <a:rPr lang="de-DE" dirty="0"/>
-              <a:t> Parse </a:t>
+              <a:t> parse </a:t>
             </a:r>
             <a:r>
               <a:rPr lang="de-DE" dirty="0" err="1"/>
@@ -15482,11 +15399,19 @@
             </a:r>
             <a:r>
               <a:rPr lang="de-DE" dirty="0" err="1"/>
-              <a:t>Consecutive</a:t>
+              <a:t>consecutive</a:t>
             </a:r>
             <a:r>
               <a:rPr lang="de-DE" dirty="0"/>
-              <a:t> Container Variables</a:t>
+              <a:t> </a:t>
+            </a:r>
+            <a:r>
+              <a:rPr lang="de-DE" dirty="0" err="1"/>
+              <a:t>container</a:t>
+            </a:r>
+            <a:r>
+              <a:rPr lang="de-DE" dirty="0"/>
+              <a:t> variables</a:t>
             </a:r>
             <a:endParaRPr lang="en-GB" dirty="0"/>
           </a:p>
@@ -15515,7 +15440,7 @@
           <a:p>
             <a:r>
               <a:rPr lang="de-DE" dirty="0" err="1"/>
-              <a:t>Difficulties</a:t>
+              <a:t>Challenges</a:t>
             </a:r>
             <a:endParaRPr lang="en-GB" dirty="0"/>
           </a:p>

</xml_diff>